<commit_message>
documentation jgiven fix wrong dependency
</commit_message>
<xml_diff>
--- a/documentation/BDD_with_JGiven.pptx
+++ b/documentation/BDD_with_JGiven.pptx
@@ -2951,7 +2951,7 @@
           <a:p>
             <a:fld id="{78617FD8-3C79-8D45-A2C8-4B6BBD51E2EE}" type="datetimeFigureOut">
               <a:rPr lang="de-DE" smtClean="0"/>
-              <a:t>20.02.2018</a:t>
+              <a:t>27.02.2018</a:t>
             </a:fld>
             <a:endParaRPr lang="de-DE"/>
           </a:p>
@@ -3116,7 +3116,7 @@
           <a:p>
             <a:fld id="{74051A69-C562-4FC5-92DC-994CDC1376A2}" type="datetimeFigureOut">
               <a:rPr lang="en-US" smtClean="0"/>
-              <a:t>20.02.2018</a:t>
+              <a:t>27.02.2018</a:t>
             </a:fld>
             <a:endParaRPr lang="en-US"/>
           </a:p>
@@ -15040,7 +15040,7 @@
                 <a:effectLst/>
                 <a:latin typeface="Droid Sans Mono"/>
               </a:rPr>
-              <a:t>jgiven-testng</a:t>
+              <a:t>jgiven-junit</a:t>
             </a:r>
             <a:r>
               <a:rPr kumimoji="0" lang="en-US" altLang="en-US" sz="1000" b="0" i="0" u="none" strike="noStrike" cap="none" normalizeH="0" baseline="0" dirty="0">
@@ -15381,7 +15381,33 @@
                 <a:effectLst/>
                 <a:latin typeface="Droid Sans Mono"/>
               </a:rPr>
-              <a:t> 'com.tngtech.jgiven:jgiven-testng:0.15.3’ </a:t>
+              <a:t> 'com.tngtech.jgiven</a:t>
+            </a:r>
+            <a:r>
+              <a:rPr kumimoji="0" lang="en-US" altLang="en-US" sz="1000" b="0" i="0" u="none" strike="noStrike" cap="none" normalizeH="0" baseline="0">
+                <a:ln>
+                  <a:noFill/>
+                </a:ln>
+                <a:solidFill>
+                  <a:schemeClr val="tx1"/>
+                </a:solidFill>
+                <a:effectLst/>
+                <a:latin typeface="Droid Sans Mono"/>
+              </a:rPr>
+              <a:t>:jgiven-junit:</a:t>
+            </a:r>
+            <a:r>
+              <a:rPr kumimoji="0" lang="en-US" altLang="en-US" sz="1000" b="0" i="0" u="none" strike="noStrike" cap="none" normalizeH="0" baseline="0" dirty="0">
+                <a:ln>
+                  <a:noFill/>
+                </a:ln>
+                <a:solidFill>
+                  <a:schemeClr val="tx1"/>
+                </a:solidFill>
+                <a:effectLst/>
+                <a:latin typeface="Droid Sans Mono"/>
+              </a:rPr>
+              <a:t>0.15.3’ </a:t>
             </a:r>
           </a:p>
           <a:p>

</xml_diff>

<commit_message>
JGiven post pre-final version
</commit_message>
<xml_diff>
--- a/documentation/BDD_with_JGiven.pptx
+++ b/documentation/BDD_with_JGiven.pptx
@@ -2951,7 +2951,7 @@
           <a:p>
             <a:fld id="{78617FD8-3C79-8D45-A2C8-4B6BBD51E2EE}" type="datetimeFigureOut">
               <a:rPr lang="de-DE" smtClean="0"/>
-              <a:t>27.02.2018</a:t>
+              <a:t>28.02.2018</a:t>
             </a:fld>
             <a:endParaRPr lang="de-DE"/>
           </a:p>
@@ -3116,7 +3116,7 @@
           <a:p>
             <a:fld id="{74051A69-C562-4FC5-92DC-994CDC1376A2}" type="datetimeFigureOut">
               <a:rPr lang="en-US" smtClean="0"/>
-              <a:t>27.02.2018</a:t>
+              <a:t>28.02.2018</a:t>
             </a:fld>
             <a:endParaRPr lang="en-US"/>
           </a:p>
@@ -16393,7 +16393,7 @@
               <a:t>Stage&lt;</a:t>
             </a:r>
             <a:r>
-              <a:rPr kumimoji="0" lang="en-US" altLang="en-US" sz="1000" b="0" i="0" u="none" strike="noStrike" cap="none" normalizeH="0" baseline="0" dirty="0">
+              <a:rPr kumimoji="0" lang="en-US" altLang="en-US" sz="1000" b="0" i="0" u="none" strike="noStrike" cap="none" normalizeH="0" baseline="0" dirty="0" err="1">
                 <a:ln>
                   <a:noFill/>
                 </a:ln>
@@ -16403,7 +16403,7 @@
                 <a:effectLst/>
                 <a:latin typeface="Source Code Pro"/>
               </a:rPr>
-              <a:t>SELF</a:t>
+              <a:t>GivenBook</a:t>
             </a:r>
             <a:r>
               <a:rPr kumimoji="0" lang="en-US" altLang="en-US" sz="1000" b="0" i="0" u="none" strike="noStrike" cap="none" normalizeH="0" baseline="0" dirty="0">
@@ -17437,7 +17437,7 @@
         <p:spPr bwMode="auto">
           <a:xfrm>
             <a:off x="1128489" y="1526015"/>
-            <a:ext cx="3852337" cy="2862322"/>
+            <a:ext cx="4769254" cy="2862322"/>
           </a:xfrm>
           <a:prstGeom prst="rect">
             <a:avLst/>
@@ -17551,7 +17551,34 @@
                 <a:effectLst/>
                 <a:latin typeface="Source Code Pro"/>
               </a:rPr>
-              <a:t>Stage&lt;</a:t>
+              <a:t>Stage</a:t>
+            </a:r>
+            <a:r>
+              <a:rPr lang="en-US" altLang="en-US" sz="1000" dirty="0">
+                <a:solidFill>
+                  <a:srgbClr val="000000"/>
+                </a:solidFill>
+                <a:latin typeface="Source Code Pro"/>
+              </a:rPr>
+              <a:t>&lt;</a:t>
+            </a:r>
+            <a:r>
+              <a:rPr lang="en-US" altLang="en-US" sz="1000" dirty="0" err="1">
+                <a:solidFill>
+                  <a:srgbClr val="000000"/>
+                </a:solidFill>
+                <a:latin typeface="Source Code Pro"/>
+              </a:rPr>
+              <a:t>WhenOrderService</a:t>
+            </a:r>
+            <a:r>
+              <a:rPr lang="en-US" altLang="en-US" sz="1000" dirty="0">
+                <a:solidFill>
+                  <a:srgbClr val="000000"/>
+                </a:solidFill>
+                <a:latin typeface="Source Code Pro"/>
+              </a:rPr>
+              <a:t>&gt; </a:t>
             </a:r>
             <a:r>
               <a:rPr kumimoji="0" lang="en-US" altLang="en-US" sz="1000" b="0" i="0" u="none" strike="noStrike" cap="none" normalizeH="0" baseline="0" dirty="0">
@@ -17559,25 +17586,12 @@
                   <a:noFill/>
                 </a:ln>
                 <a:solidFill>
-                  <a:srgbClr val="20999D"/>
+                  <a:srgbClr val="000000"/>
                 </a:solidFill>
                 <a:effectLst/>
                 <a:latin typeface="Source Code Pro"/>
               </a:rPr>
-              <a:t>SELF</a:t>
-            </a:r>
-            <a:r>
-              <a:rPr kumimoji="0" lang="en-US" altLang="en-US" sz="1000" b="0" i="0" u="none" strike="noStrike" cap="none" normalizeH="0" baseline="0" dirty="0">
-                <a:ln>
-                  <a:noFill/>
-                </a:ln>
-                <a:solidFill>
-                  <a:srgbClr val="000000"/>
-                </a:solidFill>
-                <a:effectLst/>
-                <a:latin typeface="Source Code Pro"/>
-              </a:rPr>
-              <a:t>&gt; {</a:t>
+              <a:t>{</a:t>
             </a:r>
             <a:br>
               <a:rPr kumimoji="0" lang="en-US" altLang="en-US" sz="1000" b="0" i="0" u="none" strike="noStrike" cap="none" normalizeH="0" baseline="0" dirty="0">
@@ -18685,7 +18699,34 @@
                 <a:effectLst/>
                 <a:latin typeface="Source Code Pro"/>
               </a:rPr>
-              <a:t>Stage&lt;</a:t>
+              <a:t>Stage</a:t>
+            </a:r>
+            <a:r>
+              <a:rPr lang="en-US" altLang="en-US" sz="1000" dirty="0">
+                <a:solidFill>
+                  <a:srgbClr val="000000"/>
+                </a:solidFill>
+                <a:latin typeface="Source Code Pro"/>
+              </a:rPr>
+              <a:t>&lt;</a:t>
+            </a:r>
+            <a:r>
+              <a:rPr lang="en-US" altLang="en-US" sz="1000" dirty="0" err="1">
+                <a:solidFill>
+                  <a:srgbClr val="000000"/>
+                </a:solidFill>
+                <a:latin typeface="Source Code Pro"/>
+              </a:rPr>
+              <a:t>ThenLibrary</a:t>
+            </a:r>
+            <a:r>
+              <a:rPr lang="en-US" altLang="en-US" sz="1000" dirty="0">
+                <a:solidFill>
+                  <a:srgbClr val="000000"/>
+                </a:solidFill>
+                <a:latin typeface="Source Code Pro"/>
+              </a:rPr>
+              <a:t>&gt; </a:t>
             </a:r>
             <a:r>
               <a:rPr kumimoji="0" lang="en-US" altLang="en-US" sz="1000" b="0" i="0" u="none" strike="noStrike" cap="none" normalizeH="0" baseline="0" dirty="0">
@@ -18693,25 +18734,12 @@
                   <a:noFill/>
                 </a:ln>
                 <a:solidFill>
-                  <a:srgbClr val="20999D"/>
+                  <a:srgbClr val="000000"/>
                 </a:solidFill>
                 <a:effectLst/>
                 <a:latin typeface="Source Code Pro"/>
               </a:rPr>
-              <a:t>SELF</a:t>
-            </a:r>
-            <a:r>
-              <a:rPr kumimoji="0" lang="en-US" altLang="en-US" sz="1000" b="0" i="0" u="none" strike="noStrike" cap="none" normalizeH="0" baseline="0" dirty="0">
-                <a:ln>
-                  <a:noFill/>
-                </a:ln>
-                <a:solidFill>
-                  <a:srgbClr val="000000"/>
-                </a:solidFill>
-                <a:effectLst/>
-                <a:latin typeface="Source Code Pro"/>
-              </a:rPr>
-              <a:t>&gt; {</a:t>
+              <a:t>{</a:t>
             </a:r>
             <a:br>
               <a:rPr kumimoji="0" lang="en-US" altLang="en-US" sz="1000" b="0" i="0" u="none" strike="noStrike" cap="none" normalizeH="0" baseline="0" dirty="0">

</xml_diff>